<commit_message>
small changes, handling dialog boxes
</commit_message>
<xml_diff>
--- a/2024 splash screen.pptx
+++ b/2024 splash screen.pptx
@@ -423,6 +423,30 @@
     </pc:docChg>
   </pc:docChgLst>
   <pc:docChgLst>
+    <pc:chgData name="Jan Menssen" userId="3ba2e1889f63798f" providerId="LiveId" clId="{2A19175E-9221-6543-A44F-356C5944658E}"/>
+    <pc:docChg chg="modSld">
+      <pc:chgData name="Jan Menssen" userId="3ba2e1889f63798f" providerId="LiveId" clId="{2A19175E-9221-6543-A44F-356C5944658E}" dt="2024-02-11T21:19:13.784" v="3" actId="20577"/>
+      <pc:docMkLst>
+        <pc:docMk/>
+      </pc:docMkLst>
+      <pc:sldChg chg="modSp mod">
+        <pc:chgData name="Jan Menssen" userId="3ba2e1889f63798f" providerId="LiveId" clId="{2A19175E-9221-6543-A44F-356C5944658E}" dt="2024-02-11T21:19:13.784" v="3" actId="20577"/>
+        <pc:sldMkLst>
+          <pc:docMk/>
+          <pc:sldMk cId="3252887633" sldId="266"/>
+        </pc:sldMkLst>
+        <pc:spChg chg="mod">
+          <ac:chgData name="Jan Menssen" userId="3ba2e1889f63798f" providerId="LiveId" clId="{2A19175E-9221-6543-A44F-356C5944658E}" dt="2024-02-11T21:19:13.784" v="3" actId="20577"/>
+          <ac:spMkLst>
+            <pc:docMk/>
+            <pc:sldMk cId="3252887633" sldId="266"/>
+            <ac:spMk id="11" creationId="{66BF3AEA-4EB3-F203-B4C3-9269F74760E7}"/>
+          </ac:spMkLst>
+        </pc:spChg>
+      </pc:sldChg>
+    </pc:docChg>
+  </pc:docChgLst>
+  <pc:docChgLst>
     <pc:chgData name="Jan Menssen" userId="3ba2e1889f63798f" providerId="LiveId" clId="{6F2B92A3-A519-644F-87EF-870CC4EC4B48}"/>
     <pc:docChg chg="modSld">
       <pc:chgData name="Jan Menssen" userId="3ba2e1889f63798f" providerId="LiveId" clId="{6F2B92A3-A519-644F-87EF-870CC4EC4B48}" dt="2024-02-07T13:02:59.121" v="31" actId="14100"/>
@@ -532,7 +556,7 @@
             <a:fld id="{ABEE1EBA-AC86-4632-8267-60DAA6EE8046}" type="datetimeFigureOut">
               <a:rPr lang="nl-NL" smtClean="0"/>
               <a:pPr/>
-              <a:t>07-02-2024</a:t>
+              <a:t>11-02-2024</a:t>
             </a:fld>
             <a:endParaRPr lang="nl-NL"/>
           </a:p>
@@ -13166,7 +13190,7 @@
           <a:p>
             <a:r>
               <a:rPr lang="nl-NL" sz="4800" b="1" dirty="0" err="1"/>
-              <a:t>PhysioMon</a:t>
+              <a:t>physiomon</a:t>
             </a:r>
             <a:endParaRPr lang="nl-NL" sz="4800" b="1" dirty="0"/>
           </a:p>

</xml_diff>

<commit_message>
colors added to C version
</commit_message>
<xml_diff>
--- a/2024 splash screen.pptx
+++ b/2024 splash screen.pptx
@@ -447,6 +447,46 @@
     </pc:docChg>
   </pc:docChgLst>
   <pc:docChgLst>
+    <pc:chgData name="Jan Menssen" userId="3ba2e1889f63798f" providerId="LiveId" clId="{1DC87FDA-DF5E-2F40-8DE1-1DAB0EBA7FDD}"/>
+    <pc:docChg chg="modSld">
+      <pc:chgData name="Jan Menssen" userId="3ba2e1889f63798f" providerId="LiveId" clId="{1DC87FDA-DF5E-2F40-8DE1-1DAB0EBA7FDD}" dt="2024-03-07T21:43:56.250" v="20" actId="20577"/>
+      <pc:docMkLst>
+        <pc:docMk/>
+      </pc:docMkLst>
+      <pc:sldChg chg="modSp mod">
+        <pc:chgData name="Jan Menssen" userId="3ba2e1889f63798f" providerId="LiveId" clId="{1DC87FDA-DF5E-2F40-8DE1-1DAB0EBA7FDD}" dt="2024-03-07T21:43:56.250" v="20" actId="20577"/>
+        <pc:sldMkLst>
+          <pc:docMk/>
+          <pc:sldMk cId="3252887633" sldId="266"/>
+        </pc:sldMkLst>
+        <pc:spChg chg="mod">
+          <ac:chgData name="Jan Menssen" userId="3ba2e1889f63798f" providerId="LiveId" clId="{1DC87FDA-DF5E-2F40-8DE1-1DAB0EBA7FDD}" dt="2024-03-07T21:43:56.250" v="20" actId="20577"/>
+          <ac:spMkLst>
+            <pc:docMk/>
+            <pc:sldMk cId="3252887633" sldId="266"/>
+            <ac:spMk id="11" creationId="{66BF3AEA-4EB3-F203-B4C3-9269F74760E7}"/>
+          </ac:spMkLst>
+        </pc:spChg>
+        <pc:spChg chg="mod">
+          <ac:chgData name="Jan Menssen" userId="3ba2e1889f63798f" providerId="LiveId" clId="{1DC87FDA-DF5E-2F40-8DE1-1DAB0EBA7FDD}" dt="2024-03-07T21:43:38.141" v="16" actId="1035"/>
+          <ac:spMkLst>
+            <pc:docMk/>
+            <pc:sldMk cId="3252887633" sldId="266"/>
+            <ac:spMk id="12" creationId="{219C8374-7616-4EC8-921B-4F60C2005E10}"/>
+          </ac:spMkLst>
+        </pc:spChg>
+        <pc:picChg chg="mod">
+          <ac:chgData name="Jan Menssen" userId="3ba2e1889f63798f" providerId="LiveId" clId="{1DC87FDA-DF5E-2F40-8DE1-1DAB0EBA7FDD}" dt="2024-03-07T21:42:43.095" v="5" actId="1035"/>
+          <ac:picMkLst>
+            <pc:docMk/>
+            <pc:sldMk cId="3252887633" sldId="266"/>
+            <ac:picMk id="3" creationId="{36083DE6-8818-77CF-6862-E97A33DE9D51}"/>
+          </ac:picMkLst>
+        </pc:picChg>
+      </pc:sldChg>
+    </pc:docChg>
+  </pc:docChgLst>
+  <pc:docChgLst>
     <pc:chgData name="Jan Menssen" userId="3ba2e1889f63798f" providerId="LiveId" clId="{6F2B92A3-A519-644F-87EF-870CC4EC4B48}"/>
     <pc:docChg chg="modSld">
       <pc:chgData name="Jan Menssen" userId="3ba2e1889f63798f" providerId="LiveId" clId="{6F2B92A3-A519-644F-87EF-870CC4EC4B48}" dt="2024-02-07T13:02:59.121" v="31" actId="14100"/>
@@ -556,7 +596,7 @@
             <a:fld id="{ABEE1EBA-AC86-4632-8267-60DAA6EE8046}" type="datetimeFigureOut">
               <a:rPr lang="nl-NL" smtClean="0"/>
               <a:pPr/>
-              <a:t>11-02-2024</a:t>
+              <a:t>07-03-2024</a:t>
             </a:fld>
             <a:endParaRPr lang="nl-NL"/>
           </a:p>
@@ -13152,7 +13192,7 @@
         </p:blipFill>
         <p:spPr>
           <a:xfrm>
-            <a:off x="310393" y="971550"/>
+            <a:off x="310393" y="1123950"/>
             <a:ext cx="4070059" cy="2709656"/>
           </a:xfrm>
           <a:prstGeom prst="rect">
@@ -13190,7 +13230,7 @@
           <a:p>
             <a:r>
               <a:rPr lang="nl-NL" sz="4800" b="1" dirty="0" err="1"/>
-              <a:t>physiomon</a:t>
+              <a:t>PhysioMon</a:t>
             </a:r>
             <a:endParaRPr lang="nl-NL" sz="4800" b="1" dirty="0"/>
           </a:p>
@@ -13298,8 +13338,8 @@
         </p:nvSpPr>
         <p:spPr>
           <a:xfrm>
-            <a:off x="6140114" y="3204686"/>
-            <a:ext cx="2673220" cy="738664"/>
+            <a:off x="5670897" y="3181350"/>
+            <a:ext cx="3352801" cy="923330"/>
           </a:xfrm>
           <a:prstGeom prst="rect">
             <a:avLst/>
@@ -13313,42 +13353,42 @@
           <a:lstStyle/>
           <a:p>
             <a:r>
-              <a:rPr lang="nl-NL" sz="1400" dirty="0"/>
+              <a:rPr lang="nl-NL" dirty="0"/>
               <a:t>Jan Menssen</a:t>
             </a:r>
           </a:p>
           <a:p>
             <a:r>
-              <a:rPr lang="nl-NL" sz="1400" dirty="0" err="1"/>
+              <a:rPr lang="nl-NL" dirty="0" err="1"/>
               <a:t>Medical</a:t>
             </a:r>
             <a:r>
-              <a:rPr lang="nl-NL" sz="1400" dirty="0"/>
+              <a:rPr lang="nl-NL" dirty="0"/>
               <a:t> </a:t>
             </a:r>
             <a:r>
-              <a:rPr lang="nl-NL" sz="1400" dirty="0" err="1"/>
+              <a:rPr lang="nl-NL" dirty="0" err="1"/>
               <a:t>UltraSound</a:t>
             </a:r>
             <a:r>
-              <a:rPr lang="nl-NL" sz="1400" dirty="0"/>
+              <a:rPr lang="nl-NL" dirty="0"/>
               <a:t> Image Center</a:t>
             </a:r>
           </a:p>
           <a:p>
             <a:r>
-              <a:rPr lang="nl-NL" sz="1400" dirty="0"/>
+              <a:rPr lang="nl-NL" dirty="0"/>
               <a:t>Dept. </a:t>
             </a:r>
             <a:r>
-              <a:rPr lang="nl-NL" sz="1400" dirty="0" err="1"/>
+              <a:rPr lang="nl-NL" dirty="0" err="1"/>
               <a:t>Medical</a:t>
             </a:r>
             <a:r>
-              <a:rPr lang="nl-NL" sz="1400" dirty="0"/>
+              <a:rPr lang="nl-NL" dirty="0"/>
               <a:t> Imaging</a:t>
             </a:r>
-            <a:endParaRPr lang="en-US" sz="1400" dirty="0"/>
+            <a:endParaRPr lang="en-US" dirty="0"/>
           </a:p>
         </p:txBody>
       </p:sp>

</xml_diff>